<commit_message>
Additions to the ppt
</commit_message>
<xml_diff>
--- a/Ideas/Marketing Analysis Application using Multi-Agent RAG.pptx
+++ b/Ideas/Marketing Analysis Application using Multi-Agent RAG.pptx
@@ -5,7 +5,7 @@
     <p:sldMasterId id="2147483712" r:id="rId1"/>
   </p:sldMasterIdLst>
   <p:notesMasterIdLst>
-    <p:notesMasterId r:id="rId15"/>
+    <p:notesMasterId r:id="rId16"/>
   </p:notesMasterIdLst>
   <p:sldIdLst>
     <p:sldId id="256" r:id="rId2"/>
@@ -17,10 +17,11 @@
     <p:sldId id="262" r:id="rId8"/>
     <p:sldId id="263" r:id="rId9"/>
     <p:sldId id="266" r:id="rId10"/>
-    <p:sldId id="264" r:id="rId11"/>
-    <p:sldId id="265" r:id="rId12"/>
-    <p:sldId id="269" r:id="rId13"/>
-    <p:sldId id="267" r:id="rId14"/>
+    <p:sldId id="270" r:id="rId11"/>
+    <p:sldId id="264" r:id="rId12"/>
+    <p:sldId id="265" r:id="rId13"/>
+    <p:sldId id="269" r:id="rId14"/>
+    <p:sldId id="267" r:id="rId15"/>
   </p:sldIdLst>
   <p:sldSz cx="12192000" cy="6858000"/>
   <p:notesSz cx="6858000" cy="9144000"/>
@@ -119,6 +120,11 @@
       </a:defRPr>
     </a:lvl9pPr>
   </p:defaultTextStyle>
+  <p:extLst>
+    <p:ext uri="{EFAFB233-063F-42B5-8137-9DF3F51BA10A}">
+      <p15:sldGuideLst xmlns:p15="http://schemas.microsoft.com/office/powerpoint/2012/main"/>
+    </p:ext>
+  </p:extLst>
 </p:presentation>
 </file>
 
@@ -537,7 +543,7 @@
           <a:p>
             <a:fld id="{4CE5ACB6-DA73-4558-A68E-2E7CDF3CC7A1}" type="slidenum">
               <a:rPr lang="en-IN" smtClean="0"/>
-              <a:t>11</a:t>
+              <a:t>12</a:t>
             </a:fld>
             <a:endParaRPr lang="en-IN"/>
           </a:p>
@@ -4466,9 +4472,23 @@
 <file path=ppt/slides/slide10.xml><?xml version="1.0" encoding="utf-8"?>
 <p:sld xmlns:a="http://schemas.openxmlformats.org/drawingml/2006/main" xmlns:r="http://schemas.openxmlformats.org/officeDocument/2006/relationships" xmlns:p="http://schemas.openxmlformats.org/presentationml/2006/main">
   <p:cSld>
+    <p:bg>
+      <p:bgPr>
+        <a:solidFill>
+          <a:schemeClr val="bg1"/>
+        </a:solidFill>
+        <a:effectLst/>
+      </p:bgPr>
+    </p:bg>
     <p:spTree>
       <p:nvGrpSpPr>
-        <p:cNvPr id="1" name=""/>
+        <p:cNvPr id="1" name="">
+          <a:extLst>
+            <a:ext uri="{FF2B5EF4-FFF2-40B4-BE49-F238E27FC236}">
+              <a16:creationId xmlns:a16="http://schemas.microsoft.com/office/drawing/2014/main" id="{61051B51-63E0-8E44-7398-649C2B7B11F7}"/>
+            </a:ext>
+          </a:extLst>
+        </p:cNvPr>
         <p:cNvGrpSpPr/>
         <p:nvPr/>
       </p:nvGrpSpPr>
@@ -4482,121 +4502,160 @@
       </p:grpSpPr>
       <p:sp>
         <p:nvSpPr>
-          <p:cNvPr id="2" name="Title 1">
-            <a:extLst>
-              <a:ext uri="{FF2B5EF4-FFF2-40B4-BE49-F238E27FC236}">
-                <a16:creationId xmlns:a16="http://schemas.microsoft.com/office/drawing/2014/main" id="{0E65EC9C-6061-4DDC-7C31-ED802228EC29}"/>
-              </a:ext>
-            </a:extLst>
-          </p:cNvPr>
-          <p:cNvSpPr>
-            <a:spLocks noGrp="1"/>
-          </p:cNvSpPr>
-          <p:nvPr>
-            <p:ph type="title"/>
-          </p:nvPr>
-        </p:nvSpPr>
-        <p:spPr/>
-        <p:txBody>
-          <a:bodyPr/>
-          <a:lstStyle/>
-          <a:p>
-            <a:r>
-              <a:rPr lang="en-US" dirty="0"/>
-              <a:t>Integration</a:t>
-            </a:r>
-            <a:endParaRPr lang="en-IN" dirty="0"/>
-          </a:p>
-        </p:txBody>
-      </p:sp>
-      <p:sp>
-        <p:nvSpPr>
-          <p:cNvPr id="3" name="Content Placeholder 2">
-            <a:extLst>
-              <a:ext uri="{FF2B5EF4-FFF2-40B4-BE49-F238E27FC236}">
-                <a16:creationId xmlns:a16="http://schemas.microsoft.com/office/drawing/2014/main" id="{84134D9E-0DA6-E3DC-7018-6B2581B12AFD}"/>
-              </a:ext>
-            </a:extLst>
-          </p:cNvPr>
-          <p:cNvSpPr>
-            <a:spLocks noGrp="1"/>
-          </p:cNvSpPr>
-          <p:nvPr>
-            <p:ph idx="1"/>
-          </p:nvPr>
-        </p:nvSpPr>
-        <p:spPr/>
-        <p:txBody>
-          <a:bodyPr/>
-          <a:lstStyle/>
-          <a:p>
-            <a:r>
-              <a:rPr lang="en-US" dirty="0"/>
-              <a:t>After our models have worked, the information is passed to a final summarizer.</a:t>
-            </a:r>
-          </a:p>
-          <a:p>
-            <a:r>
-              <a:rPr lang="en-US" dirty="0"/>
-              <a:t>This will generate the overall sentiment analysis of the product based on the rating of each comment/article.</a:t>
-            </a:r>
-          </a:p>
-          <a:p>
-            <a:r>
-              <a:rPr lang="en-US" dirty="0"/>
-              <a:t>A helpful summary will also be generated which allows the company to take decisions on improving their product.</a:t>
-            </a:r>
-            <a:endParaRPr lang="en-IN" dirty="0"/>
-          </a:p>
-        </p:txBody>
-      </p:sp>
-    </p:spTree>
-    <p:extLst>
-      <p:ext uri="{BB962C8B-B14F-4D97-AF65-F5344CB8AC3E}">
-        <p14:creationId xmlns:p14="http://schemas.microsoft.com/office/powerpoint/2010/main" val="1714772688"/>
-      </p:ext>
-    </p:extLst>
-  </p:cSld>
-  <p:clrMapOvr>
-    <a:masterClrMapping/>
-  </p:clrMapOvr>
-  <p:transition spd="slow">
-    <p:push dir="u"/>
-  </p:transition>
-</p:sld>
-</file>
-
-<file path=ppt/slides/slide11.xml><?xml version="1.0" encoding="utf-8"?>
-<p:sld xmlns:a="http://schemas.openxmlformats.org/drawingml/2006/main" xmlns:r="http://schemas.openxmlformats.org/officeDocument/2006/relationships" xmlns:p="http://schemas.openxmlformats.org/presentationml/2006/main">
-  <p:cSld>
-    <p:bg>
-      <p:bgPr>
-        <a:solidFill>
-          <a:schemeClr val="bg1"/>
-        </a:solidFill>
-        <a:effectLst/>
-      </p:bgPr>
-    </p:bg>
-    <p:spTree>
-      <p:nvGrpSpPr>
-        <p:cNvPr id="1" name=""/>
-        <p:cNvGrpSpPr/>
-        <p:nvPr/>
-      </p:nvGrpSpPr>
-      <p:grpSpPr>
-        <a:xfrm>
-          <a:off x="0" y="0"/>
-          <a:ext cx="0" cy="0"/>
-          <a:chOff x="0" y="0"/>
-          <a:chExt cx="0" cy="0"/>
-        </a:xfrm>
-      </p:grpSpPr>
+          <p:cNvPr id="18" name="Rectangle 17">
+            <a:extLst>
+              <a:ext uri="{FF2B5EF4-FFF2-40B4-BE49-F238E27FC236}">
+                <a16:creationId xmlns:a16="http://schemas.microsoft.com/office/drawing/2014/main" id="{BD4C0BBB-0042-4603-A226-6117F3FD5B3C}"/>
+              </a:ext>
+              <a:ext uri="{C183D7F6-B498-43B3-948B-1728B52AA6E4}">
+                <adec:decorative xmlns:adec="http://schemas.microsoft.com/office/drawing/2017/decorative" val="1"/>
+              </a:ext>
+            </a:extLst>
+          </p:cNvPr>
+          <p:cNvSpPr>
+            <a:spLocks noGrp="1" noRot="1" noChangeAspect="1" noMove="1" noResize="1" noEditPoints="1" noAdjustHandles="1" noChangeArrowheads="1" noChangeShapeType="1" noTextEdit="1"/>
+          </p:cNvSpPr>
+          <p:nvPr>
+            <p:extLst>
+              <p:ext uri="{386F3935-93C4-4BCD-93E2-E3B085C9AB24}">
+                <p16:designElem xmlns:p16="http://schemas.microsoft.com/office/powerpoint/2015/main" val="1"/>
+              </p:ext>
+            </p:extLst>
+          </p:nvPr>
+        </p:nvSpPr>
+        <p:spPr>
+          <a:xfrm rot="10800000" flipH="1">
+            <a:off x="0" y="6400799"/>
+            <a:ext cx="12192000" cy="456773"/>
+          </a:xfrm>
+          <a:prstGeom prst="rect">
+            <a:avLst/>
+          </a:prstGeom>
+          <a:gradFill>
+            <a:gsLst>
+              <a:gs pos="14000">
+                <a:schemeClr val="accent4">
+                  <a:alpha val="28000"/>
+                </a:schemeClr>
+              </a:gs>
+              <a:gs pos="100000">
+                <a:schemeClr val="accent5">
+                  <a:alpha val="85000"/>
+                </a:schemeClr>
+              </a:gs>
+            </a:gsLst>
+            <a:lin ang="6000000" scaled="0"/>
+          </a:gradFill>
+          <a:ln>
+            <a:noFill/>
+          </a:ln>
+        </p:spPr>
+        <p:style>
+          <a:lnRef idx="2">
+            <a:schemeClr val="accent1">
+              <a:shade val="50000"/>
+            </a:schemeClr>
+          </a:lnRef>
+          <a:fillRef idx="1">
+            <a:schemeClr val="accent1"/>
+          </a:fillRef>
+          <a:effectRef idx="0">
+            <a:schemeClr val="accent1"/>
+          </a:effectRef>
+          <a:fontRef idx="minor">
+            <a:schemeClr val="lt1"/>
+          </a:fontRef>
+        </p:style>
+        <p:txBody>
+          <a:bodyPr rtlCol="0" anchor="ctr"/>
+          <a:lstStyle/>
+          <a:p>
+            <a:pPr algn="ctr"/>
+            <a:endParaRPr lang="en-US"/>
+          </a:p>
+        </p:txBody>
+      </p:sp>
+      <p:sp>
+        <p:nvSpPr>
+          <p:cNvPr id="20" name="Rectangle 19">
+            <a:extLst>
+              <a:ext uri="{FF2B5EF4-FFF2-40B4-BE49-F238E27FC236}">
+                <a16:creationId xmlns:a16="http://schemas.microsoft.com/office/drawing/2014/main" id="{EC44F520-2598-460E-9F91-B02F60830CA2}"/>
+              </a:ext>
+              <a:ext uri="{C183D7F6-B498-43B3-948B-1728B52AA6E4}">
+                <adec:decorative xmlns:adec="http://schemas.microsoft.com/office/drawing/2017/decorative" val="1"/>
+              </a:ext>
+            </a:extLst>
+          </p:cNvPr>
+          <p:cNvSpPr>
+            <a:spLocks noGrp="1" noRot="1" noChangeAspect="1" noMove="1" noResize="1" noEditPoints="1" noAdjustHandles="1" noChangeArrowheads="1" noChangeShapeType="1" noTextEdit="1"/>
+          </p:cNvSpPr>
+          <p:nvPr>
+            <p:extLst>
+              <p:ext uri="{386F3935-93C4-4BCD-93E2-E3B085C9AB24}">
+                <p16:designElem xmlns:p16="http://schemas.microsoft.com/office/powerpoint/2015/main" val="1"/>
+              </p:ext>
+            </p:extLst>
+          </p:nvPr>
+        </p:nvSpPr>
+        <p:spPr>
+          <a:xfrm flipH="1">
+            <a:off x="4038600" y="6400799"/>
+            <a:ext cx="8153398" cy="456772"/>
+          </a:xfrm>
+          <a:prstGeom prst="rect">
+            <a:avLst/>
+          </a:prstGeom>
+          <a:gradFill>
+            <a:gsLst>
+              <a:gs pos="9000">
+                <a:schemeClr val="accent2">
+                  <a:lumMod val="60000"/>
+                  <a:lumOff val="40000"/>
+                  <a:alpha val="55000"/>
+                </a:schemeClr>
+              </a:gs>
+              <a:gs pos="99000">
+                <a:schemeClr val="accent2"/>
+              </a:gs>
+            </a:gsLst>
+            <a:lin ang="14400000" scaled="0"/>
+          </a:gradFill>
+          <a:ln>
+            <a:noFill/>
+          </a:ln>
+        </p:spPr>
+        <p:style>
+          <a:lnRef idx="2">
+            <a:schemeClr val="accent1">
+              <a:shade val="50000"/>
+            </a:schemeClr>
+          </a:lnRef>
+          <a:fillRef idx="1">
+            <a:schemeClr val="accent1"/>
+          </a:fillRef>
+          <a:effectRef idx="0">
+            <a:schemeClr val="accent1"/>
+          </a:effectRef>
+          <a:fontRef idx="minor">
+            <a:schemeClr val="lt1"/>
+          </a:fontRef>
+        </p:style>
+        <p:txBody>
+          <a:bodyPr rtlCol="0" anchor="ctr"/>
+          <a:lstStyle/>
+          <a:p>
+            <a:pPr algn="ctr"/>
+            <a:endParaRPr lang="en-US"/>
+          </a:p>
+        </p:txBody>
+      </p:sp>
       <p:sp useBgFill="1">
         <p:nvSpPr>
-          <p:cNvPr id="9" name="Rectangle 8">
-            <a:extLst>
-              <a:ext uri="{FF2B5EF4-FFF2-40B4-BE49-F238E27FC236}">
-                <a16:creationId xmlns:a16="http://schemas.microsoft.com/office/drawing/2014/main" id="{E3CBB9B1-7B7D-4BA1-A1AF-572168B39539}"/>
+          <p:cNvPr id="22" name="Rectangle 21">
+            <a:extLst>
+              <a:ext uri="{FF2B5EF4-FFF2-40B4-BE49-F238E27FC236}">
+                <a16:creationId xmlns:a16="http://schemas.microsoft.com/office/drawing/2014/main" id="{1DBC8414-BE7E-4B6C-A114-B2C3795C883F}"/>
               </a:ext>
               <a:ext uri="{C183D7F6-B498-43B3-948B-1728B52AA6E4}">
                 <adec:decorative xmlns:adec="http://schemas.microsoft.com/office/drawing/2017/decorative" val="1"/>
@@ -4669,533 +4728,7 @@
       </p:sp>
       <p:sp>
         <p:nvSpPr>
-          <p:cNvPr id="2" name="Title 1">
-            <a:extLst>
-              <a:ext uri="{FF2B5EF4-FFF2-40B4-BE49-F238E27FC236}">
-                <a16:creationId xmlns:a16="http://schemas.microsoft.com/office/drawing/2014/main" id="{5BF5DBDD-33CE-8002-A2CD-2C19333D4EB9}"/>
-              </a:ext>
-            </a:extLst>
-          </p:cNvPr>
-          <p:cNvSpPr>
-            <a:spLocks noGrp="1"/>
-          </p:cNvSpPr>
-          <p:nvPr>
-            <p:ph type="title"/>
-          </p:nvPr>
-        </p:nvSpPr>
-        <p:spPr>
-          <a:xfrm>
-            <a:off x="8643193" y="457201"/>
-            <a:ext cx="3091607" cy="1727643"/>
-          </a:xfrm>
-        </p:spPr>
-        <p:txBody>
-          <a:bodyPr anchor="b">
-            <a:normAutofit/>
-          </a:bodyPr>
-          <a:lstStyle/>
-          <a:p>
-            <a:r>
-              <a:rPr lang="en-US" sz="2800"/>
-              <a:t>Overall Structure</a:t>
-            </a:r>
-            <a:endParaRPr lang="en-IN" sz="2800"/>
-          </a:p>
-        </p:txBody>
-      </p:sp>
-      <p:pic>
-        <p:nvPicPr>
-          <p:cNvPr id="4" name="Picture 3">
-            <a:extLst>
-              <a:ext uri="{FF2B5EF4-FFF2-40B4-BE49-F238E27FC236}">
-                <a16:creationId xmlns:a16="http://schemas.microsoft.com/office/drawing/2014/main" id="{36648072-B52D-937A-5CF3-7F90A600E4BC}"/>
-              </a:ext>
-            </a:extLst>
-          </p:cNvPr>
-          <p:cNvPicPr>
-            <a:picLocks noChangeAspect="1"/>
-          </p:cNvPicPr>
-          <p:nvPr/>
-        </p:nvPicPr>
-        <p:blipFill rotWithShape="1">
-          <a:blip r:embed="rId3">
-            <a:extLst>
-              <a:ext uri="{28A0092B-C50C-407E-A947-70E740481C1C}">
-                <a14:useLocalDpi xmlns:a14="http://schemas.microsoft.com/office/drawing/2010/main" val="0"/>
-              </a:ext>
-            </a:extLst>
-          </a:blip>
-          <a:srcRect l="22856" r="5910" b="7016"/>
-          <a:stretch/>
-        </p:blipFill>
-        <p:spPr bwMode="auto">
-          <a:xfrm>
-            <a:off x="19078" y="0"/>
-            <a:ext cx="8115280" cy="5958673"/>
-          </a:xfrm>
-          <a:prstGeom prst="rect">
-            <a:avLst/>
-          </a:prstGeom>
-          <a:noFill/>
-          <a:extLst>
-            <a:ext uri="{53640926-AAD7-44D8-BBD7-CCE9431645EC}">
-              <a14:shadowObscured xmlns:a14="http://schemas.microsoft.com/office/drawing/2010/main"/>
-            </a:ext>
-          </a:extLst>
-        </p:spPr>
-      </p:pic>
-      <p:sp>
-        <p:nvSpPr>
-          <p:cNvPr id="3" name="Content Placeholder 2">
-            <a:extLst>
-              <a:ext uri="{FF2B5EF4-FFF2-40B4-BE49-F238E27FC236}">
-                <a16:creationId xmlns:a16="http://schemas.microsoft.com/office/drawing/2014/main" id="{DC857D83-DD4C-E8F7-949C-67A4F9341676}"/>
-              </a:ext>
-            </a:extLst>
-          </p:cNvPr>
-          <p:cNvSpPr>
-            <a:spLocks noGrp="1"/>
-          </p:cNvSpPr>
-          <p:nvPr>
-            <p:ph idx="1"/>
-          </p:nvPr>
-        </p:nvSpPr>
-        <p:spPr>
-          <a:xfrm>
-            <a:off x="8643193" y="2530549"/>
-            <a:ext cx="2942813" cy="3428124"/>
-          </a:xfrm>
-        </p:spPr>
-        <p:txBody>
-          <a:bodyPr>
-            <a:normAutofit/>
-          </a:bodyPr>
-          <a:lstStyle/>
-          <a:p>
-            <a:endParaRPr lang="en-IN" sz="1400"/>
-          </a:p>
-        </p:txBody>
-      </p:sp>
-      <p:sp>
-        <p:nvSpPr>
-          <p:cNvPr id="11" name="Rectangle 10">
-            <a:extLst>
-              <a:ext uri="{FF2B5EF4-FFF2-40B4-BE49-F238E27FC236}">
-                <a16:creationId xmlns:a16="http://schemas.microsoft.com/office/drawing/2014/main" id="{907741FC-B544-4A6E-B831-6789D042333D}"/>
-              </a:ext>
-              <a:ext uri="{C183D7F6-B498-43B3-948B-1728B52AA6E4}">
-                <adec:decorative xmlns:adec="http://schemas.microsoft.com/office/drawing/2017/decorative" val="1"/>
-              </a:ext>
-            </a:extLst>
-          </p:cNvPr>
-          <p:cNvSpPr>
-            <a:spLocks noGrp="1" noRot="1" noChangeAspect="1" noMove="1" noResize="1" noEditPoints="1" noAdjustHandles="1" noChangeArrowheads="1" noChangeShapeType="1" noTextEdit="1"/>
-          </p:cNvSpPr>
-          <p:nvPr>
-            <p:extLst>
-              <p:ext uri="{386F3935-93C4-4BCD-93E2-E3B085C9AB24}">
-                <p16:designElem xmlns:p16="http://schemas.microsoft.com/office/powerpoint/2015/main" val="1"/>
-              </p:ext>
-            </p:extLst>
-          </p:nvPr>
-        </p:nvSpPr>
-        <p:spPr>
-          <a:xfrm flipH="1">
-            <a:off x="-1" y="6408741"/>
-            <a:ext cx="12191998" cy="449257"/>
-          </a:xfrm>
-          <a:prstGeom prst="rect">
-            <a:avLst/>
-          </a:prstGeom>
-          <a:gradFill>
-            <a:gsLst>
-              <a:gs pos="34000">
-                <a:schemeClr val="accent4">
-                  <a:alpha val="73000"/>
-                </a:schemeClr>
-              </a:gs>
-              <a:gs pos="100000">
-                <a:schemeClr val="accent5">
-                  <a:alpha val="89000"/>
-                </a:schemeClr>
-              </a:gs>
-            </a:gsLst>
-            <a:lin ang="8400000" scaled="0"/>
-          </a:gradFill>
-          <a:ln>
-            <a:noFill/>
-          </a:ln>
-        </p:spPr>
-        <p:style>
-          <a:lnRef idx="2">
-            <a:schemeClr val="accent1">
-              <a:shade val="50000"/>
-            </a:schemeClr>
-          </a:lnRef>
-          <a:fillRef idx="1">
-            <a:schemeClr val="accent1"/>
-          </a:fillRef>
-          <a:effectRef idx="0">
-            <a:schemeClr val="accent1"/>
-          </a:effectRef>
-          <a:fontRef idx="minor">
-            <a:schemeClr val="lt1"/>
-          </a:fontRef>
-        </p:style>
-        <p:txBody>
-          <a:bodyPr rtlCol="0" anchor="ctr"/>
-          <a:lstStyle/>
-          <a:p>
-            <a:pPr algn="ctr"/>
-            <a:endParaRPr lang="en-US"/>
-          </a:p>
-        </p:txBody>
-      </p:sp>
-      <p:sp>
-        <p:nvSpPr>
-          <p:cNvPr id="13" name="Rectangle 12">
-            <a:extLst>
-              <a:ext uri="{FF2B5EF4-FFF2-40B4-BE49-F238E27FC236}">
-                <a16:creationId xmlns:a16="http://schemas.microsoft.com/office/drawing/2014/main" id="{3F0BE7ED-7814-4273-B18A-F26CC0380380}"/>
-              </a:ext>
-              <a:ext uri="{C183D7F6-B498-43B3-948B-1728B52AA6E4}">
-                <adec:decorative xmlns:adec="http://schemas.microsoft.com/office/drawing/2017/decorative" val="1"/>
-              </a:ext>
-            </a:extLst>
-          </p:cNvPr>
-          <p:cNvSpPr>
-            <a:spLocks noGrp="1" noRot="1" noChangeAspect="1" noMove="1" noResize="1" noEditPoints="1" noAdjustHandles="1" noChangeArrowheads="1" noChangeShapeType="1" noTextEdit="1"/>
-          </p:cNvSpPr>
-          <p:nvPr>
-            <p:extLst>
-              <p:ext uri="{386F3935-93C4-4BCD-93E2-E3B085C9AB24}">
-                <p16:designElem xmlns:p16="http://schemas.microsoft.com/office/powerpoint/2015/main" val="1"/>
-              </p:ext>
-            </p:extLst>
-          </p:nvPr>
-        </p:nvSpPr>
-        <p:spPr>
-          <a:xfrm flipH="1">
-            <a:off x="0" y="6408314"/>
-            <a:ext cx="8115300" cy="449258"/>
-          </a:xfrm>
-          <a:prstGeom prst="rect">
-            <a:avLst/>
-          </a:prstGeom>
-          <a:gradFill>
-            <a:gsLst>
-              <a:gs pos="22000">
-                <a:schemeClr val="accent5">
-                  <a:lumMod val="60000"/>
-                  <a:lumOff val="40000"/>
-                  <a:alpha val="55000"/>
-                </a:schemeClr>
-              </a:gs>
-              <a:gs pos="99000">
-                <a:schemeClr val="accent2"/>
-              </a:gs>
-            </a:gsLst>
-            <a:lin ang="11400000" scaled="0"/>
-          </a:gradFill>
-          <a:ln>
-            <a:noFill/>
-          </a:ln>
-        </p:spPr>
-        <p:style>
-          <a:lnRef idx="2">
-            <a:schemeClr val="accent1">
-              <a:shade val="50000"/>
-            </a:schemeClr>
-          </a:lnRef>
-          <a:fillRef idx="1">
-            <a:schemeClr val="accent1"/>
-          </a:fillRef>
-          <a:effectRef idx="0">
-            <a:schemeClr val="accent1"/>
-          </a:effectRef>
-          <a:fontRef idx="minor">
-            <a:schemeClr val="lt1"/>
-          </a:fontRef>
-        </p:style>
-        <p:txBody>
-          <a:bodyPr rtlCol="0" anchor="ctr"/>
-          <a:lstStyle/>
-          <a:p>
-            <a:pPr algn="ctr"/>
-            <a:endParaRPr lang="en-US"/>
-          </a:p>
-        </p:txBody>
-      </p:sp>
-    </p:spTree>
-    <p:extLst>
-      <p:ext uri="{BB962C8B-B14F-4D97-AF65-F5344CB8AC3E}">
-        <p14:creationId xmlns:p14="http://schemas.microsoft.com/office/powerpoint/2010/main" val="154018096"/>
-      </p:ext>
-    </p:extLst>
-  </p:cSld>
-  <p:clrMapOvr>
-    <a:masterClrMapping/>
-  </p:clrMapOvr>
-  <p:transition spd="slow">
-    <p:push dir="u"/>
-  </p:transition>
-</p:sld>
-</file>
-
-<file path=ppt/slides/slide12.xml><?xml version="1.0" encoding="utf-8"?>
-<p:sld xmlns:a="http://schemas.openxmlformats.org/drawingml/2006/main" xmlns:r="http://schemas.openxmlformats.org/officeDocument/2006/relationships" xmlns:p="http://schemas.openxmlformats.org/presentationml/2006/main">
-  <p:cSld>
-    <p:bg>
-      <p:bgPr>
-        <a:solidFill>
-          <a:schemeClr val="bg1"/>
-        </a:solidFill>
-        <a:effectLst/>
-      </p:bgPr>
-    </p:bg>
-    <p:spTree>
-      <p:nvGrpSpPr>
-        <p:cNvPr id="1" name=""/>
-        <p:cNvGrpSpPr/>
-        <p:nvPr/>
-      </p:nvGrpSpPr>
-      <p:grpSpPr>
-        <a:xfrm>
-          <a:off x="0" y="0"/>
-          <a:ext cx="0" cy="0"/>
-          <a:chOff x="0" y="0"/>
-          <a:chExt cx="0" cy="0"/>
-        </a:xfrm>
-      </p:grpSpPr>
-      <p:sp>
-        <p:nvSpPr>
-          <p:cNvPr id="23" name="Rectangle 22">
-            <a:extLst>
-              <a:ext uri="{FF2B5EF4-FFF2-40B4-BE49-F238E27FC236}">
-                <a16:creationId xmlns:a16="http://schemas.microsoft.com/office/drawing/2014/main" id="{BD4C0BBB-0042-4603-A226-6117F3FD5B3C}"/>
-              </a:ext>
-              <a:ext uri="{C183D7F6-B498-43B3-948B-1728B52AA6E4}">
-                <adec:decorative xmlns:adec="http://schemas.microsoft.com/office/drawing/2017/decorative" val="1"/>
-              </a:ext>
-            </a:extLst>
-          </p:cNvPr>
-          <p:cNvSpPr>
-            <a:spLocks noGrp="1" noRot="1" noChangeAspect="1" noMove="1" noResize="1" noEditPoints="1" noAdjustHandles="1" noChangeArrowheads="1" noChangeShapeType="1" noTextEdit="1"/>
-          </p:cNvSpPr>
-          <p:nvPr>
-            <p:extLst>
-              <p:ext uri="{386F3935-93C4-4BCD-93E2-E3B085C9AB24}">
-                <p16:designElem xmlns:p16="http://schemas.microsoft.com/office/powerpoint/2015/main" val="1"/>
-              </p:ext>
-            </p:extLst>
-          </p:nvPr>
-        </p:nvSpPr>
-        <p:spPr>
-          <a:xfrm rot="10800000" flipH="1">
-            <a:off x="0" y="6400799"/>
-            <a:ext cx="12192000" cy="456773"/>
-          </a:xfrm>
-          <a:prstGeom prst="rect">
-            <a:avLst/>
-          </a:prstGeom>
-          <a:gradFill>
-            <a:gsLst>
-              <a:gs pos="14000">
-                <a:schemeClr val="accent4">
-                  <a:alpha val="28000"/>
-                </a:schemeClr>
-              </a:gs>
-              <a:gs pos="100000">
-                <a:schemeClr val="accent5">
-                  <a:alpha val="85000"/>
-                </a:schemeClr>
-              </a:gs>
-            </a:gsLst>
-            <a:lin ang="6000000" scaled="0"/>
-          </a:gradFill>
-          <a:ln>
-            <a:noFill/>
-          </a:ln>
-        </p:spPr>
-        <p:style>
-          <a:lnRef idx="2">
-            <a:schemeClr val="accent1">
-              <a:shade val="50000"/>
-            </a:schemeClr>
-          </a:lnRef>
-          <a:fillRef idx="1">
-            <a:schemeClr val="accent1"/>
-          </a:fillRef>
-          <a:effectRef idx="0">
-            <a:schemeClr val="accent1"/>
-          </a:effectRef>
-          <a:fontRef idx="minor">
-            <a:schemeClr val="lt1"/>
-          </a:fontRef>
-        </p:style>
-        <p:txBody>
-          <a:bodyPr rtlCol="0" anchor="ctr"/>
-          <a:lstStyle/>
-          <a:p>
-            <a:pPr algn="ctr"/>
-            <a:endParaRPr lang="en-US"/>
-          </a:p>
-        </p:txBody>
-      </p:sp>
-      <p:sp>
-        <p:nvSpPr>
-          <p:cNvPr id="25" name="Rectangle 24">
-            <a:extLst>
-              <a:ext uri="{FF2B5EF4-FFF2-40B4-BE49-F238E27FC236}">
-                <a16:creationId xmlns:a16="http://schemas.microsoft.com/office/drawing/2014/main" id="{EC44F520-2598-460E-9F91-B02F60830CA2}"/>
-              </a:ext>
-              <a:ext uri="{C183D7F6-B498-43B3-948B-1728B52AA6E4}">
-                <adec:decorative xmlns:adec="http://schemas.microsoft.com/office/drawing/2017/decorative" val="1"/>
-              </a:ext>
-            </a:extLst>
-          </p:cNvPr>
-          <p:cNvSpPr>
-            <a:spLocks noGrp="1" noRot="1" noChangeAspect="1" noMove="1" noResize="1" noEditPoints="1" noAdjustHandles="1" noChangeArrowheads="1" noChangeShapeType="1" noTextEdit="1"/>
-          </p:cNvSpPr>
-          <p:nvPr>
-            <p:extLst>
-              <p:ext uri="{386F3935-93C4-4BCD-93E2-E3B085C9AB24}">
-                <p16:designElem xmlns:p16="http://schemas.microsoft.com/office/powerpoint/2015/main" val="1"/>
-              </p:ext>
-            </p:extLst>
-          </p:nvPr>
-        </p:nvSpPr>
-        <p:spPr>
-          <a:xfrm flipH="1">
-            <a:off x="4038600" y="6400799"/>
-            <a:ext cx="8153398" cy="456772"/>
-          </a:xfrm>
-          <a:prstGeom prst="rect">
-            <a:avLst/>
-          </a:prstGeom>
-          <a:gradFill>
-            <a:gsLst>
-              <a:gs pos="9000">
-                <a:schemeClr val="accent2">
-                  <a:lumMod val="60000"/>
-                  <a:lumOff val="40000"/>
-                  <a:alpha val="55000"/>
-                </a:schemeClr>
-              </a:gs>
-              <a:gs pos="99000">
-                <a:schemeClr val="accent2"/>
-              </a:gs>
-            </a:gsLst>
-            <a:lin ang="14400000" scaled="0"/>
-          </a:gradFill>
-          <a:ln>
-            <a:noFill/>
-          </a:ln>
-        </p:spPr>
-        <p:style>
-          <a:lnRef idx="2">
-            <a:schemeClr val="accent1">
-              <a:shade val="50000"/>
-            </a:schemeClr>
-          </a:lnRef>
-          <a:fillRef idx="1">
-            <a:schemeClr val="accent1"/>
-          </a:fillRef>
-          <a:effectRef idx="0">
-            <a:schemeClr val="accent1"/>
-          </a:effectRef>
-          <a:fontRef idx="minor">
-            <a:schemeClr val="lt1"/>
-          </a:fontRef>
-        </p:style>
-        <p:txBody>
-          <a:bodyPr rtlCol="0" anchor="ctr"/>
-          <a:lstStyle/>
-          <a:p>
-            <a:pPr algn="ctr"/>
-            <a:endParaRPr lang="en-US"/>
-          </a:p>
-        </p:txBody>
-      </p:sp>
-      <p:sp useBgFill="1">
-        <p:nvSpPr>
-          <p:cNvPr id="27" name="Rectangle 26">
-            <a:extLst>
-              <a:ext uri="{FF2B5EF4-FFF2-40B4-BE49-F238E27FC236}">
-                <a16:creationId xmlns:a16="http://schemas.microsoft.com/office/drawing/2014/main" id="{1DBC8414-BE7E-4B6C-A114-B2C3795C883F}"/>
-              </a:ext>
-              <a:ext uri="{C183D7F6-B498-43B3-948B-1728B52AA6E4}">
-                <adec:decorative xmlns:adec="http://schemas.microsoft.com/office/drawing/2017/decorative" val="1"/>
-              </a:ext>
-            </a:extLst>
-          </p:cNvPr>
-          <p:cNvSpPr>
-            <a:spLocks noGrp="1" noRot="1" noChangeAspect="1" noMove="1" noResize="1" noEditPoints="1" noAdjustHandles="1" noChangeArrowheads="1" noChangeShapeType="1" noTextEdit="1"/>
-          </p:cNvSpPr>
-          <p:nvPr>
-            <p:extLst>
-              <p:ext uri="{386F3935-93C4-4BCD-93E2-E3B085C9AB24}">
-                <p16:designElem xmlns:p16="http://schemas.microsoft.com/office/powerpoint/2015/main" val="1"/>
-              </p:ext>
-            </p:extLst>
-          </p:nvPr>
-        </p:nvSpPr>
-        <p:spPr>
-          <a:xfrm>
-            <a:off x="0" y="0"/>
-            <a:ext cx="12192000" cy="6858000"/>
-          </a:xfrm>
-          <a:prstGeom prst="rect">
-            <a:avLst/>
-          </a:prstGeom>
-          <a:ln w="12700" cap="flat" cmpd="sng" algn="ctr">
-            <a:noFill/>
-            <a:prstDash val="solid"/>
-            <a:miter lim="800000"/>
-          </a:ln>
-          <a:effectLst/>
-          <a:extLst>
-            <a:ext uri="{91240B29-F687-4F45-9708-019B960494DF}">
-              <a14:hiddenLine xmlns:a14="http://schemas.microsoft.com/office/drawing/2010/main" w="12700" cap="flat" cmpd="sng" algn="ctr">
-                <a:solidFill>
-                  <a:schemeClr val="accent1">
-                    <a:shade val="50000"/>
-                  </a:schemeClr>
-                </a:solidFill>
-                <a:prstDash val="solid"/>
-                <a:miter lim="800000"/>
-              </a14:hiddenLine>
-            </a:ext>
-          </a:extLst>
-        </p:spPr>
-        <p:style>
-          <a:lnRef idx="2">
-            <a:schemeClr val="accent1">
-              <a:shade val="50000"/>
-            </a:schemeClr>
-          </a:lnRef>
-          <a:fillRef idx="1">
-            <a:schemeClr val="accent1"/>
-          </a:fillRef>
-          <a:effectRef idx="0">
-            <a:schemeClr val="accent1"/>
-          </a:effectRef>
-          <a:fontRef idx="minor">
-            <a:schemeClr val="lt1"/>
-          </a:fontRef>
-        </p:style>
-        <p:txBody>
-          <a:bodyPr rtlCol="0" anchor="ctr"/>
-          <a:lstStyle/>
-          <a:p>
-            <a:pPr algn="ctr"/>
-            <a:endParaRPr lang="en-US"/>
-          </a:p>
-        </p:txBody>
-      </p:sp>
-      <p:sp>
-        <p:nvSpPr>
-          <p:cNvPr id="29" name="Rectangle 28">
+          <p:cNvPr id="24" name="Rectangle 23">
             <a:extLst>
               <a:ext uri="{FF2B5EF4-FFF2-40B4-BE49-F238E27FC236}">
                 <a16:creationId xmlns:a16="http://schemas.microsoft.com/office/drawing/2014/main" id="{0EC398C5-5C2E-4038-9DB3-DE2B5A9BEFFB}"/>
@@ -5268,7 +4801,7 @@
       </p:sp>
       <p:sp>
         <p:nvSpPr>
-          <p:cNvPr id="31" name="Rectangle 30">
+          <p:cNvPr id="26" name="Rectangle 25">
             <a:extLst>
               <a:ext uri="{FF2B5EF4-FFF2-40B4-BE49-F238E27FC236}">
                 <a16:creationId xmlns:a16="http://schemas.microsoft.com/office/drawing/2014/main" id="{A2F10B26-073B-4B10-8AAA-161242DD82B0}"/>
@@ -5345,7 +4878,7 @@
       </p:sp>
       <p:sp>
         <p:nvSpPr>
-          <p:cNvPr id="33" name="Rectangle 32">
+          <p:cNvPr id="28" name="Rectangle 27">
             <a:extLst>
               <a:ext uri="{FF2B5EF4-FFF2-40B4-BE49-F238E27FC236}">
                 <a16:creationId xmlns:a16="http://schemas.microsoft.com/office/drawing/2014/main" id="{610DBBC7-698F-4A54-B1CB-A99F9CC356DF}"/>
@@ -5420,7 +4953,7 @@
       </p:sp>
       <p:sp>
         <p:nvSpPr>
-          <p:cNvPr id="35" name="Freeform: Shape 34">
+          <p:cNvPr id="30" name="Freeform: Shape 29">
             <a:extLst>
               <a:ext uri="{FF2B5EF4-FFF2-40B4-BE49-F238E27FC236}">
                 <a16:creationId xmlns:a16="http://schemas.microsoft.com/office/drawing/2014/main" id="{DE6E822A-8BCF-432C-83E6-BBE821476CD4}"/>
@@ -5592,6 +5125,1285 @@
       </p:sp>
       <p:sp>
         <p:nvSpPr>
+          <p:cNvPr id="2" name="Title 1">
+            <a:extLst>
+              <a:ext uri="{FF2B5EF4-FFF2-40B4-BE49-F238E27FC236}">
+                <a16:creationId xmlns:a16="http://schemas.microsoft.com/office/drawing/2014/main" id="{1E124000-2576-755C-5B51-C45AE4D27C7B}"/>
+              </a:ext>
+            </a:extLst>
+          </p:cNvPr>
+          <p:cNvSpPr>
+            <a:spLocks noGrp="1"/>
+          </p:cNvSpPr>
+          <p:nvPr>
+            <p:ph type="title"/>
+          </p:nvPr>
+        </p:nvSpPr>
+        <p:spPr>
+          <a:xfrm>
+            <a:off x="474243" y="681317"/>
+            <a:ext cx="3236613" cy="3406187"/>
+          </a:xfrm>
+        </p:spPr>
+        <p:txBody>
+          <a:bodyPr vert="horz" lIns="0" tIns="0" rIns="0" bIns="0" rtlCol="0" anchor="b">
+            <a:normAutofit/>
+          </a:bodyPr>
+          <a:lstStyle/>
+          <a:p>
+            <a:pPr algn="r"/>
+            <a:r>
+              <a:rPr lang="en-US" sz="3200" spc="750" dirty="0">
+                <a:solidFill>
+                  <a:schemeClr val="bg1"/>
+                </a:solidFill>
+              </a:rPr>
+              <a:t>ASKING EXA TO FIND REVIEWS OF MY COMPUTER</a:t>
+            </a:r>
+          </a:p>
+        </p:txBody>
+      </p:sp>
+      <p:sp>
+        <p:nvSpPr>
+          <p:cNvPr id="3" name="Content Placeholder 2">
+            <a:extLst>
+              <a:ext uri="{FF2B5EF4-FFF2-40B4-BE49-F238E27FC236}">
+                <a16:creationId xmlns:a16="http://schemas.microsoft.com/office/drawing/2014/main" id="{9802C082-C78B-660B-B1CC-2572EF5BAD3D}"/>
+              </a:ext>
+            </a:extLst>
+          </p:cNvPr>
+          <p:cNvSpPr>
+            <a:spLocks noGrp="1"/>
+          </p:cNvSpPr>
+          <p:nvPr>
+            <p:ph idx="1"/>
+          </p:nvPr>
+        </p:nvSpPr>
+        <p:spPr>
+          <a:xfrm>
+            <a:off x="474243" y="4800600"/>
+            <a:ext cx="3230603" cy="1538784"/>
+          </a:xfrm>
+        </p:spPr>
+        <p:txBody>
+          <a:bodyPr vert="horz" lIns="0" tIns="0" rIns="0" bIns="0" rtlCol="0">
+            <a:normAutofit/>
+          </a:bodyPr>
+          <a:lstStyle/>
+          <a:p>
+            <a:pPr marL="0" indent="0" algn="r">
+              <a:lnSpc>
+                <a:spcPct val="150000"/>
+              </a:lnSpc>
+              <a:buNone/>
+            </a:pPr>
+            <a:r>
+              <a:rPr lang="en-US" sz="1600" b="1" cap="all" spc="600" dirty="0">
+                <a:solidFill>
+                  <a:schemeClr val="bg1"/>
+                </a:solidFill>
+              </a:rPr>
+              <a:t>SHOULD HAVE USED THIS BEFORE</a:t>
+            </a:r>
+          </a:p>
+          <a:p>
+            <a:pPr marL="0" indent="0" algn="r">
+              <a:lnSpc>
+                <a:spcPct val="150000"/>
+              </a:lnSpc>
+              <a:buNone/>
+            </a:pPr>
+            <a:r>
+              <a:rPr lang="en-US" sz="1600" b="1" cap="all" spc="600" dirty="0">
+                <a:solidFill>
+                  <a:schemeClr val="bg1"/>
+                </a:solidFill>
+              </a:rPr>
+              <a:t>:) </a:t>
+            </a:r>
+            <a:endParaRPr lang="en-US" sz="1200" b="1" cap="all" spc="600" dirty="0">
+              <a:solidFill>
+                <a:schemeClr val="bg1"/>
+              </a:solidFill>
+            </a:endParaRPr>
+          </a:p>
+        </p:txBody>
+      </p:sp>
+      <p:pic>
+        <p:nvPicPr>
+          <p:cNvPr id="6" name="Picture 5">
+            <a:extLst>
+              <a:ext uri="{FF2B5EF4-FFF2-40B4-BE49-F238E27FC236}">
+                <a16:creationId xmlns:a16="http://schemas.microsoft.com/office/drawing/2014/main" id="{21C0631B-1723-71B4-B32C-989DA34C2136}"/>
+              </a:ext>
+            </a:extLst>
+          </p:cNvPr>
+          <p:cNvPicPr>
+            <a:picLocks noChangeAspect="1"/>
+          </p:cNvPicPr>
+          <p:nvPr/>
+        </p:nvPicPr>
+        <p:blipFill>
+          <a:blip r:embed="rId2"/>
+          <a:stretch>
+            <a:fillRect/>
+          </a:stretch>
+        </p:blipFill>
+        <p:spPr>
+          <a:xfrm>
+            <a:off x="4503619" y="1475923"/>
+            <a:ext cx="7214138" cy="3913668"/>
+          </a:xfrm>
+          <a:prstGeom prst="rect">
+            <a:avLst/>
+          </a:prstGeom>
+        </p:spPr>
+      </p:pic>
+    </p:spTree>
+    <p:extLst>
+      <p:ext uri="{BB962C8B-B14F-4D97-AF65-F5344CB8AC3E}">
+        <p14:creationId xmlns:p14="http://schemas.microsoft.com/office/powerpoint/2010/main" val="4293391332"/>
+      </p:ext>
+    </p:extLst>
+  </p:cSld>
+  <p:clrMapOvr>
+    <a:masterClrMapping/>
+  </p:clrMapOvr>
+  <p:transition spd="slow">
+    <p:push dir="u"/>
+  </p:transition>
+</p:sld>
+</file>
+
+<file path=ppt/slides/slide11.xml><?xml version="1.0" encoding="utf-8"?>
+<p:sld xmlns:a="http://schemas.openxmlformats.org/drawingml/2006/main" xmlns:r="http://schemas.openxmlformats.org/officeDocument/2006/relationships" xmlns:p="http://schemas.openxmlformats.org/presentationml/2006/main">
+  <p:cSld>
+    <p:spTree>
+      <p:nvGrpSpPr>
+        <p:cNvPr id="1" name=""/>
+        <p:cNvGrpSpPr/>
+        <p:nvPr/>
+      </p:nvGrpSpPr>
+      <p:grpSpPr>
+        <a:xfrm>
+          <a:off x="0" y="0"/>
+          <a:ext cx="0" cy="0"/>
+          <a:chOff x="0" y="0"/>
+          <a:chExt cx="0" cy="0"/>
+        </a:xfrm>
+      </p:grpSpPr>
+      <p:sp>
+        <p:nvSpPr>
+          <p:cNvPr id="2" name="Title 1">
+            <a:extLst>
+              <a:ext uri="{FF2B5EF4-FFF2-40B4-BE49-F238E27FC236}">
+                <a16:creationId xmlns:a16="http://schemas.microsoft.com/office/drawing/2014/main" id="{0E65EC9C-6061-4DDC-7C31-ED802228EC29}"/>
+              </a:ext>
+            </a:extLst>
+          </p:cNvPr>
+          <p:cNvSpPr>
+            <a:spLocks noGrp="1"/>
+          </p:cNvSpPr>
+          <p:nvPr>
+            <p:ph type="title"/>
+          </p:nvPr>
+        </p:nvSpPr>
+        <p:spPr/>
+        <p:txBody>
+          <a:bodyPr/>
+          <a:lstStyle/>
+          <a:p>
+            <a:r>
+              <a:rPr lang="en-US" dirty="0"/>
+              <a:t>Integration</a:t>
+            </a:r>
+            <a:endParaRPr lang="en-IN" dirty="0"/>
+          </a:p>
+        </p:txBody>
+      </p:sp>
+      <p:sp>
+        <p:nvSpPr>
+          <p:cNvPr id="3" name="Content Placeholder 2">
+            <a:extLst>
+              <a:ext uri="{FF2B5EF4-FFF2-40B4-BE49-F238E27FC236}">
+                <a16:creationId xmlns:a16="http://schemas.microsoft.com/office/drawing/2014/main" id="{84134D9E-0DA6-E3DC-7018-6B2581B12AFD}"/>
+              </a:ext>
+            </a:extLst>
+          </p:cNvPr>
+          <p:cNvSpPr>
+            <a:spLocks noGrp="1"/>
+          </p:cNvSpPr>
+          <p:nvPr>
+            <p:ph idx="1"/>
+          </p:nvPr>
+        </p:nvSpPr>
+        <p:spPr/>
+        <p:txBody>
+          <a:bodyPr/>
+          <a:lstStyle/>
+          <a:p>
+            <a:r>
+              <a:rPr lang="en-US" dirty="0"/>
+              <a:t>After our models have worked, the information is passed to a final summarizer.</a:t>
+            </a:r>
+          </a:p>
+          <a:p>
+            <a:r>
+              <a:rPr lang="en-US" dirty="0"/>
+              <a:t>This will generate the overall sentiment analysis of the product based on the rating of each comment/article.</a:t>
+            </a:r>
+          </a:p>
+          <a:p>
+            <a:r>
+              <a:rPr lang="en-US" dirty="0"/>
+              <a:t>A helpful summary will also be generated which allows the company to take decisions on improving their product.</a:t>
+            </a:r>
+            <a:endParaRPr lang="en-IN" dirty="0"/>
+          </a:p>
+        </p:txBody>
+      </p:sp>
+    </p:spTree>
+    <p:extLst>
+      <p:ext uri="{BB962C8B-B14F-4D97-AF65-F5344CB8AC3E}">
+        <p14:creationId xmlns:p14="http://schemas.microsoft.com/office/powerpoint/2010/main" val="1714772688"/>
+      </p:ext>
+    </p:extLst>
+  </p:cSld>
+  <p:clrMapOvr>
+    <a:masterClrMapping/>
+  </p:clrMapOvr>
+  <p:transition spd="slow">
+    <p:push dir="u"/>
+  </p:transition>
+</p:sld>
+</file>
+
+<file path=ppt/slides/slide12.xml><?xml version="1.0" encoding="utf-8"?>
+<p:sld xmlns:a="http://schemas.openxmlformats.org/drawingml/2006/main" xmlns:r="http://schemas.openxmlformats.org/officeDocument/2006/relationships" xmlns:p="http://schemas.openxmlformats.org/presentationml/2006/main">
+  <p:cSld>
+    <p:bg>
+      <p:bgPr>
+        <a:solidFill>
+          <a:schemeClr val="bg1"/>
+        </a:solidFill>
+        <a:effectLst/>
+      </p:bgPr>
+    </p:bg>
+    <p:spTree>
+      <p:nvGrpSpPr>
+        <p:cNvPr id="1" name=""/>
+        <p:cNvGrpSpPr/>
+        <p:nvPr/>
+      </p:nvGrpSpPr>
+      <p:grpSpPr>
+        <a:xfrm>
+          <a:off x="0" y="0"/>
+          <a:ext cx="0" cy="0"/>
+          <a:chOff x="0" y="0"/>
+          <a:chExt cx="0" cy="0"/>
+        </a:xfrm>
+      </p:grpSpPr>
+      <p:sp useBgFill="1">
+        <p:nvSpPr>
+          <p:cNvPr id="9" name="Rectangle 8">
+            <a:extLst>
+              <a:ext uri="{FF2B5EF4-FFF2-40B4-BE49-F238E27FC236}">
+                <a16:creationId xmlns:a16="http://schemas.microsoft.com/office/drawing/2014/main" id="{E3CBB9B1-7B7D-4BA1-A1AF-572168B39539}"/>
+              </a:ext>
+              <a:ext uri="{C183D7F6-B498-43B3-948B-1728B52AA6E4}">
+                <adec:decorative xmlns:adec="http://schemas.microsoft.com/office/drawing/2017/decorative" val="1"/>
+              </a:ext>
+            </a:extLst>
+          </p:cNvPr>
+          <p:cNvSpPr>
+            <a:spLocks noGrp="1" noRot="1" noChangeAspect="1" noMove="1" noResize="1" noEditPoints="1" noAdjustHandles="1" noChangeArrowheads="1" noChangeShapeType="1" noTextEdit="1"/>
+          </p:cNvSpPr>
+          <p:nvPr>
+            <p:extLst>
+              <p:ext uri="{386F3935-93C4-4BCD-93E2-E3B085C9AB24}">
+                <p16:designElem xmlns:p16="http://schemas.microsoft.com/office/powerpoint/2015/main" val="1"/>
+              </p:ext>
+            </p:extLst>
+          </p:nvPr>
+        </p:nvSpPr>
+        <p:spPr>
+          <a:xfrm>
+            <a:off x="0" y="0"/>
+            <a:ext cx="12192000" cy="6858000"/>
+          </a:xfrm>
+          <a:prstGeom prst="rect">
+            <a:avLst/>
+          </a:prstGeom>
+          <a:ln w="12700" cap="flat" cmpd="sng" algn="ctr">
+            <a:noFill/>
+            <a:prstDash val="solid"/>
+            <a:miter lim="800000"/>
+          </a:ln>
+          <a:effectLst/>
+          <a:extLst>
+            <a:ext uri="{91240B29-F687-4F45-9708-019B960494DF}">
+              <a14:hiddenLine xmlns:a14="http://schemas.microsoft.com/office/drawing/2010/main" w="12700" cap="flat" cmpd="sng" algn="ctr">
+                <a:solidFill>
+                  <a:schemeClr val="accent1">
+                    <a:shade val="50000"/>
+                  </a:schemeClr>
+                </a:solidFill>
+                <a:prstDash val="solid"/>
+                <a:miter lim="800000"/>
+              </a14:hiddenLine>
+            </a:ext>
+          </a:extLst>
+        </p:spPr>
+        <p:style>
+          <a:lnRef idx="2">
+            <a:schemeClr val="accent1">
+              <a:shade val="50000"/>
+            </a:schemeClr>
+          </a:lnRef>
+          <a:fillRef idx="1">
+            <a:schemeClr val="accent1"/>
+          </a:fillRef>
+          <a:effectRef idx="0">
+            <a:schemeClr val="accent1"/>
+          </a:effectRef>
+          <a:fontRef idx="minor">
+            <a:schemeClr val="lt1"/>
+          </a:fontRef>
+        </p:style>
+        <p:txBody>
+          <a:bodyPr rtlCol="0" anchor="ctr"/>
+          <a:lstStyle/>
+          <a:p>
+            <a:pPr algn="ctr"/>
+            <a:endParaRPr lang="en-US"/>
+          </a:p>
+        </p:txBody>
+      </p:sp>
+      <p:sp>
+        <p:nvSpPr>
+          <p:cNvPr id="2" name="Title 1">
+            <a:extLst>
+              <a:ext uri="{FF2B5EF4-FFF2-40B4-BE49-F238E27FC236}">
+                <a16:creationId xmlns:a16="http://schemas.microsoft.com/office/drawing/2014/main" id="{5BF5DBDD-33CE-8002-A2CD-2C19333D4EB9}"/>
+              </a:ext>
+            </a:extLst>
+          </p:cNvPr>
+          <p:cNvSpPr>
+            <a:spLocks noGrp="1"/>
+          </p:cNvSpPr>
+          <p:nvPr>
+            <p:ph type="title"/>
+          </p:nvPr>
+        </p:nvSpPr>
+        <p:spPr>
+          <a:xfrm>
+            <a:off x="8643193" y="457201"/>
+            <a:ext cx="3091607" cy="1727643"/>
+          </a:xfrm>
+        </p:spPr>
+        <p:txBody>
+          <a:bodyPr anchor="b">
+            <a:normAutofit/>
+          </a:bodyPr>
+          <a:lstStyle/>
+          <a:p>
+            <a:r>
+              <a:rPr lang="en-US" sz="2800"/>
+              <a:t>Overall Structure</a:t>
+            </a:r>
+            <a:endParaRPr lang="en-IN" sz="2800"/>
+          </a:p>
+        </p:txBody>
+      </p:sp>
+      <p:pic>
+        <p:nvPicPr>
+          <p:cNvPr id="4" name="Picture 3">
+            <a:extLst>
+              <a:ext uri="{FF2B5EF4-FFF2-40B4-BE49-F238E27FC236}">
+                <a16:creationId xmlns:a16="http://schemas.microsoft.com/office/drawing/2014/main" id="{36648072-B52D-937A-5CF3-7F90A600E4BC}"/>
+              </a:ext>
+            </a:extLst>
+          </p:cNvPr>
+          <p:cNvPicPr>
+            <a:picLocks noChangeAspect="1"/>
+          </p:cNvPicPr>
+          <p:nvPr/>
+        </p:nvPicPr>
+        <p:blipFill rotWithShape="1">
+          <a:blip r:embed="rId3">
+            <a:extLst>
+              <a:ext uri="{28A0092B-C50C-407E-A947-70E740481C1C}">
+                <a14:useLocalDpi xmlns:a14="http://schemas.microsoft.com/office/drawing/2010/main" val="0"/>
+              </a:ext>
+            </a:extLst>
+          </a:blip>
+          <a:srcRect l="22856" r="5910" b="7016"/>
+          <a:stretch/>
+        </p:blipFill>
+        <p:spPr bwMode="auto">
+          <a:xfrm>
+            <a:off x="19078" y="0"/>
+            <a:ext cx="8115280" cy="5958673"/>
+          </a:xfrm>
+          <a:prstGeom prst="rect">
+            <a:avLst/>
+          </a:prstGeom>
+          <a:noFill/>
+          <a:extLst>
+            <a:ext uri="{53640926-AAD7-44D8-BBD7-CCE9431645EC}">
+              <a14:shadowObscured xmlns:a14="http://schemas.microsoft.com/office/drawing/2010/main"/>
+            </a:ext>
+          </a:extLst>
+        </p:spPr>
+      </p:pic>
+      <p:sp>
+        <p:nvSpPr>
+          <p:cNvPr id="3" name="Content Placeholder 2">
+            <a:extLst>
+              <a:ext uri="{FF2B5EF4-FFF2-40B4-BE49-F238E27FC236}">
+                <a16:creationId xmlns:a16="http://schemas.microsoft.com/office/drawing/2014/main" id="{DC857D83-DD4C-E8F7-949C-67A4F9341676}"/>
+              </a:ext>
+            </a:extLst>
+          </p:cNvPr>
+          <p:cNvSpPr>
+            <a:spLocks noGrp="1"/>
+          </p:cNvSpPr>
+          <p:nvPr>
+            <p:ph idx="1"/>
+          </p:nvPr>
+        </p:nvSpPr>
+        <p:spPr>
+          <a:xfrm>
+            <a:off x="8643193" y="2530549"/>
+            <a:ext cx="2942813" cy="3428124"/>
+          </a:xfrm>
+        </p:spPr>
+        <p:txBody>
+          <a:bodyPr>
+            <a:normAutofit/>
+          </a:bodyPr>
+          <a:lstStyle/>
+          <a:p>
+            <a:endParaRPr lang="en-IN" sz="1400"/>
+          </a:p>
+        </p:txBody>
+      </p:sp>
+      <p:sp>
+        <p:nvSpPr>
+          <p:cNvPr id="11" name="Rectangle 10">
+            <a:extLst>
+              <a:ext uri="{FF2B5EF4-FFF2-40B4-BE49-F238E27FC236}">
+                <a16:creationId xmlns:a16="http://schemas.microsoft.com/office/drawing/2014/main" id="{907741FC-B544-4A6E-B831-6789D042333D}"/>
+              </a:ext>
+              <a:ext uri="{C183D7F6-B498-43B3-948B-1728B52AA6E4}">
+                <adec:decorative xmlns:adec="http://schemas.microsoft.com/office/drawing/2017/decorative" val="1"/>
+              </a:ext>
+            </a:extLst>
+          </p:cNvPr>
+          <p:cNvSpPr>
+            <a:spLocks noGrp="1" noRot="1" noChangeAspect="1" noMove="1" noResize="1" noEditPoints="1" noAdjustHandles="1" noChangeArrowheads="1" noChangeShapeType="1" noTextEdit="1"/>
+          </p:cNvSpPr>
+          <p:nvPr>
+            <p:extLst>
+              <p:ext uri="{386F3935-93C4-4BCD-93E2-E3B085C9AB24}">
+                <p16:designElem xmlns:p16="http://schemas.microsoft.com/office/powerpoint/2015/main" val="1"/>
+              </p:ext>
+            </p:extLst>
+          </p:nvPr>
+        </p:nvSpPr>
+        <p:spPr>
+          <a:xfrm flipH="1">
+            <a:off x="-1" y="6408741"/>
+            <a:ext cx="12191998" cy="449257"/>
+          </a:xfrm>
+          <a:prstGeom prst="rect">
+            <a:avLst/>
+          </a:prstGeom>
+          <a:gradFill>
+            <a:gsLst>
+              <a:gs pos="34000">
+                <a:schemeClr val="accent4">
+                  <a:alpha val="73000"/>
+                </a:schemeClr>
+              </a:gs>
+              <a:gs pos="100000">
+                <a:schemeClr val="accent5">
+                  <a:alpha val="89000"/>
+                </a:schemeClr>
+              </a:gs>
+            </a:gsLst>
+            <a:lin ang="8400000" scaled="0"/>
+          </a:gradFill>
+          <a:ln>
+            <a:noFill/>
+          </a:ln>
+        </p:spPr>
+        <p:style>
+          <a:lnRef idx="2">
+            <a:schemeClr val="accent1">
+              <a:shade val="50000"/>
+            </a:schemeClr>
+          </a:lnRef>
+          <a:fillRef idx="1">
+            <a:schemeClr val="accent1"/>
+          </a:fillRef>
+          <a:effectRef idx="0">
+            <a:schemeClr val="accent1"/>
+          </a:effectRef>
+          <a:fontRef idx="minor">
+            <a:schemeClr val="lt1"/>
+          </a:fontRef>
+        </p:style>
+        <p:txBody>
+          <a:bodyPr rtlCol="0" anchor="ctr"/>
+          <a:lstStyle/>
+          <a:p>
+            <a:pPr algn="ctr"/>
+            <a:endParaRPr lang="en-US"/>
+          </a:p>
+        </p:txBody>
+      </p:sp>
+      <p:sp>
+        <p:nvSpPr>
+          <p:cNvPr id="13" name="Rectangle 12">
+            <a:extLst>
+              <a:ext uri="{FF2B5EF4-FFF2-40B4-BE49-F238E27FC236}">
+                <a16:creationId xmlns:a16="http://schemas.microsoft.com/office/drawing/2014/main" id="{3F0BE7ED-7814-4273-B18A-F26CC0380380}"/>
+              </a:ext>
+              <a:ext uri="{C183D7F6-B498-43B3-948B-1728B52AA6E4}">
+                <adec:decorative xmlns:adec="http://schemas.microsoft.com/office/drawing/2017/decorative" val="1"/>
+              </a:ext>
+            </a:extLst>
+          </p:cNvPr>
+          <p:cNvSpPr>
+            <a:spLocks noGrp="1" noRot="1" noChangeAspect="1" noMove="1" noResize="1" noEditPoints="1" noAdjustHandles="1" noChangeArrowheads="1" noChangeShapeType="1" noTextEdit="1"/>
+          </p:cNvSpPr>
+          <p:nvPr>
+            <p:extLst>
+              <p:ext uri="{386F3935-93C4-4BCD-93E2-E3B085C9AB24}">
+                <p16:designElem xmlns:p16="http://schemas.microsoft.com/office/powerpoint/2015/main" val="1"/>
+              </p:ext>
+            </p:extLst>
+          </p:nvPr>
+        </p:nvSpPr>
+        <p:spPr>
+          <a:xfrm flipH="1">
+            <a:off x="0" y="6408314"/>
+            <a:ext cx="8115300" cy="449258"/>
+          </a:xfrm>
+          <a:prstGeom prst="rect">
+            <a:avLst/>
+          </a:prstGeom>
+          <a:gradFill>
+            <a:gsLst>
+              <a:gs pos="22000">
+                <a:schemeClr val="accent5">
+                  <a:lumMod val="60000"/>
+                  <a:lumOff val="40000"/>
+                  <a:alpha val="55000"/>
+                </a:schemeClr>
+              </a:gs>
+              <a:gs pos="99000">
+                <a:schemeClr val="accent2"/>
+              </a:gs>
+            </a:gsLst>
+            <a:lin ang="11400000" scaled="0"/>
+          </a:gradFill>
+          <a:ln>
+            <a:noFill/>
+          </a:ln>
+        </p:spPr>
+        <p:style>
+          <a:lnRef idx="2">
+            <a:schemeClr val="accent1">
+              <a:shade val="50000"/>
+            </a:schemeClr>
+          </a:lnRef>
+          <a:fillRef idx="1">
+            <a:schemeClr val="accent1"/>
+          </a:fillRef>
+          <a:effectRef idx="0">
+            <a:schemeClr val="accent1"/>
+          </a:effectRef>
+          <a:fontRef idx="minor">
+            <a:schemeClr val="lt1"/>
+          </a:fontRef>
+        </p:style>
+        <p:txBody>
+          <a:bodyPr rtlCol="0" anchor="ctr"/>
+          <a:lstStyle/>
+          <a:p>
+            <a:pPr algn="ctr"/>
+            <a:endParaRPr lang="en-US"/>
+          </a:p>
+        </p:txBody>
+      </p:sp>
+    </p:spTree>
+    <p:extLst>
+      <p:ext uri="{BB962C8B-B14F-4D97-AF65-F5344CB8AC3E}">
+        <p14:creationId xmlns:p14="http://schemas.microsoft.com/office/powerpoint/2010/main" val="154018096"/>
+      </p:ext>
+    </p:extLst>
+  </p:cSld>
+  <p:clrMapOvr>
+    <a:masterClrMapping/>
+  </p:clrMapOvr>
+  <p:transition spd="slow">
+    <p:push dir="u"/>
+  </p:transition>
+</p:sld>
+</file>
+
+<file path=ppt/slides/slide13.xml><?xml version="1.0" encoding="utf-8"?>
+<p:sld xmlns:a="http://schemas.openxmlformats.org/drawingml/2006/main" xmlns:r="http://schemas.openxmlformats.org/officeDocument/2006/relationships" xmlns:p="http://schemas.openxmlformats.org/presentationml/2006/main">
+  <p:cSld>
+    <p:bg>
+      <p:bgPr>
+        <a:solidFill>
+          <a:schemeClr val="bg1"/>
+        </a:solidFill>
+        <a:effectLst/>
+      </p:bgPr>
+    </p:bg>
+    <p:spTree>
+      <p:nvGrpSpPr>
+        <p:cNvPr id="1" name=""/>
+        <p:cNvGrpSpPr/>
+        <p:nvPr/>
+      </p:nvGrpSpPr>
+      <p:grpSpPr>
+        <a:xfrm>
+          <a:off x="0" y="0"/>
+          <a:ext cx="0" cy="0"/>
+          <a:chOff x="0" y="0"/>
+          <a:chExt cx="0" cy="0"/>
+        </a:xfrm>
+      </p:grpSpPr>
+      <p:sp>
+        <p:nvSpPr>
+          <p:cNvPr id="23" name="Rectangle 22">
+            <a:extLst>
+              <a:ext uri="{FF2B5EF4-FFF2-40B4-BE49-F238E27FC236}">
+                <a16:creationId xmlns:a16="http://schemas.microsoft.com/office/drawing/2014/main" id="{BD4C0BBB-0042-4603-A226-6117F3FD5B3C}"/>
+              </a:ext>
+              <a:ext uri="{C183D7F6-B498-43B3-948B-1728B52AA6E4}">
+                <adec:decorative xmlns:adec="http://schemas.microsoft.com/office/drawing/2017/decorative" val="1"/>
+              </a:ext>
+            </a:extLst>
+          </p:cNvPr>
+          <p:cNvSpPr>
+            <a:spLocks noGrp="1" noRot="1" noChangeAspect="1" noMove="1" noResize="1" noEditPoints="1" noAdjustHandles="1" noChangeArrowheads="1" noChangeShapeType="1" noTextEdit="1"/>
+          </p:cNvSpPr>
+          <p:nvPr>
+            <p:extLst>
+              <p:ext uri="{386F3935-93C4-4BCD-93E2-E3B085C9AB24}">
+                <p16:designElem xmlns:p16="http://schemas.microsoft.com/office/powerpoint/2015/main" val="1"/>
+              </p:ext>
+            </p:extLst>
+          </p:nvPr>
+        </p:nvSpPr>
+        <p:spPr>
+          <a:xfrm rot="10800000" flipH="1">
+            <a:off x="0" y="6400799"/>
+            <a:ext cx="12192000" cy="456773"/>
+          </a:xfrm>
+          <a:prstGeom prst="rect">
+            <a:avLst/>
+          </a:prstGeom>
+          <a:gradFill>
+            <a:gsLst>
+              <a:gs pos="14000">
+                <a:schemeClr val="accent4">
+                  <a:alpha val="28000"/>
+                </a:schemeClr>
+              </a:gs>
+              <a:gs pos="100000">
+                <a:schemeClr val="accent5">
+                  <a:alpha val="85000"/>
+                </a:schemeClr>
+              </a:gs>
+            </a:gsLst>
+            <a:lin ang="6000000" scaled="0"/>
+          </a:gradFill>
+          <a:ln>
+            <a:noFill/>
+          </a:ln>
+        </p:spPr>
+        <p:style>
+          <a:lnRef idx="2">
+            <a:schemeClr val="accent1">
+              <a:shade val="50000"/>
+            </a:schemeClr>
+          </a:lnRef>
+          <a:fillRef idx="1">
+            <a:schemeClr val="accent1"/>
+          </a:fillRef>
+          <a:effectRef idx="0">
+            <a:schemeClr val="accent1"/>
+          </a:effectRef>
+          <a:fontRef idx="minor">
+            <a:schemeClr val="lt1"/>
+          </a:fontRef>
+        </p:style>
+        <p:txBody>
+          <a:bodyPr rtlCol="0" anchor="ctr"/>
+          <a:lstStyle/>
+          <a:p>
+            <a:pPr algn="ctr"/>
+            <a:endParaRPr lang="en-US"/>
+          </a:p>
+        </p:txBody>
+      </p:sp>
+      <p:sp>
+        <p:nvSpPr>
+          <p:cNvPr id="25" name="Rectangle 24">
+            <a:extLst>
+              <a:ext uri="{FF2B5EF4-FFF2-40B4-BE49-F238E27FC236}">
+                <a16:creationId xmlns:a16="http://schemas.microsoft.com/office/drawing/2014/main" id="{EC44F520-2598-460E-9F91-B02F60830CA2}"/>
+              </a:ext>
+              <a:ext uri="{C183D7F6-B498-43B3-948B-1728B52AA6E4}">
+                <adec:decorative xmlns:adec="http://schemas.microsoft.com/office/drawing/2017/decorative" val="1"/>
+              </a:ext>
+            </a:extLst>
+          </p:cNvPr>
+          <p:cNvSpPr>
+            <a:spLocks noGrp="1" noRot="1" noChangeAspect="1" noMove="1" noResize="1" noEditPoints="1" noAdjustHandles="1" noChangeArrowheads="1" noChangeShapeType="1" noTextEdit="1"/>
+          </p:cNvSpPr>
+          <p:nvPr>
+            <p:extLst>
+              <p:ext uri="{386F3935-93C4-4BCD-93E2-E3B085C9AB24}">
+                <p16:designElem xmlns:p16="http://schemas.microsoft.com/office/powerpoint/2015/main" val="1"/>
+              </p:ext>
+            </p:extLst>
+          </p:nvPr>
+        </p:nvSpPr>
+        <p:spPr>
+          <a:xfrm flipH="1">
+            <a:off x="4038600" y="6400799"/>
+            <a:ext cx="8153398" cy="456772"/>
+          </a:xfrm>
+          <a:prstGeom prst="rect">
+            <a:avLst/>
+          </a:prstGeom>
+          <a:gradFill>
+            <a:gsLst>
+              <a:gs pos="9000">
+                <a:schemeClr val="accent2">
+                  <a:lumMod val="60000"/>
+                  <a:lumOff val="40000"/>
+                  <a:alpha val="55000"/>
+                </a:schemeClr>
+              </a:gs>
+              <a:gs pos="99000">
+                <a:schemeClr val="accent2"/>
+              </a:gs>
+            </a:gsLst>
+            <a:lin ang="14400000" scaled="0"/>
+          </a:gradFill>
+          <a:ln>
+            <a:noFill/>
+          </a:ln>
+        </p:spPr>
+        <p:style>
+          <a:lnRef idx="2">
+            <a:schemeClr val="accent1">
+              <a:shade val="50000"/>
+            </a:schemeClr>
+          </a:lnRef>
+          <a:fillRef idx="1">
+            <a:schemeClr val="accent1"/>
+          </a:fillRef>
+          <a:effectRef idx="0">
+            <a:schemeClr val="accent1"/>
+          </a:effectRef>
+          <a:fontRef idx="minor">
+            <a:schemeClr val="lt1"/>
+          </a:fontRef>
+        </p:style>
+        <p:txBody>
+          <a:bodyPr rtlCol="0" anchor="ctr"/>
+          <a:lstStyle/>
+          <a:p>
+            <a:pPr algn="ctr"/>
+            <a:endParaRPr lang="en-US"/>
+          </a:p>
+        </p:txBody>
+      </p:sp>
+      <p:sp useBgFill="1">
+        <p:nvSpPr>
+          <p:cNvPr id="27" name="Rectangle 26">
+            <a:extLst>
+              <a:ext uri="{FF2B5EF4-FFF2-40B4-BE49-F238E27FC236}">
+                <a16:creationId xmlns:a16="http://schemas.microsoft.com/office/drawing/2014/main" id="{1DBC8414-BE7E-4B6C-A114-B2C3795C883F}"/>
+              </a:ext>
+              <a:ext uri="{C183D7F6-B498-43B3-948B-1728B52AA6E4}">
+                <adec:decorative xmlns:adec="http://schemas.microsoft.com/office/drawing/2017/decorative" val="1"/>
+              </a:ext>
+            </a:extLst>
+          </p:cNvPr>
+          <p:cNvSpPr>
+            <a:spLocks noGrp="1" noRot="1" noChangeAspect="1" noMove="1" noResize="1" noEditPoints="1" noAdjustHandles="1" noChangeArrowheads="1" noChangeShapeType="1" noTextEdit="1"/>
+          </p:cNvSpPr>
+          <p:nvPr>
+            <p:extLst>
+              <p:ext uri="{386F3935-93C4-4BCD-93E2-E3B085C9AB24}">
+                <p16:designElem xmlns:p16="http://schemas.microsoft.com/office/powerpoint/2015/main" val="1"/>
+              </p:ext>
+            </p:extLst>
+          </p:nvPr>
+        </p:nvSpPr>
+        <p:spPr>
+          <a:xfrm>
+            <a:off x="0" y="0"/>
+            <a:ext cx="12192000" cy="6858000"/>
+          </a:xfrm>
+          <a:prstGeom prst="rect">
+            <a:avLst/>
+          </a:prstGeom>
+          <a:ln w="12700" cap="flat" cmpd="sng" algn="ctr">
+            <a:noFill/>
+            <a:prstDash val="solid"/>
+            <a:miter lim="800000"/>
+          </a:ln>
+          <a:effectLst/>
+          <a:extLst>
+            <a:ext uri="{91240B29-F687-4F45-9708-019B960494DF}">
+              <a14:hiddenLine xmlns:a14="http://schemas.microsoft.com/office/drawing/2010/main" w="12700" cap="flat" cmpd="sng" algn="ctr">
+                <a:solidFill>
+                  <a:schemeClr val="accent1">
+                    <a:shade val="50000"/>
+                  </a:schemeClr>
+                </a:solidFill>
+                <a:prstDash val="solid"/>
+                <a:miter lim="800000"/>
+              </a14:hiddenLine>
+            </a:ext>
+          </a:extLst>
+        </p:spPr>
+        <p:style>
+          <a:lnRef idx="2">
+            <a:schemeClr val="accent1">
+              <a:shade val="50000"/>
+            </a:schemeClr>
+          </a:lnRef>
+          <a:fillRef idx="1">
+            <a:schemeClr val="accent1"/>
+          </a:fillRef>
+          <a:effectRef idx="0">
+            <a:schemeClr val="accent1"/>
+          </a:effectRef>
+          <a:fontRef idx="minor">
+            <a:schemeClr val="lt1"/>
+          </a:fontRef>
+        </p:style>
+        <p:txBody>
+          <a:bodyPr rtlCol="0" anchor="ctr"/>
+          <a:lstStyle/>
+          <a:p>
+            <a:pPr algn="ctr"/>
+            <a:endParaRPr lang="en-US"/>
+          </a:p>
+        </p:txBody>
+      </p:sp>
+      <p:sp>
+        <p:nvSpPr>
+          <p:cNvPr id="29" name="Rectangle 28">
+            <a:extLst>
+              <a:ext uri="{FF2B5EF4-FFF2-40B4-BE49-F238E27FC236}">
+                <a16:creationId xmlns:a16="http://schemas.microsoft.com/office/drawing/2014/main" id="{0EC398C5-5C2E-4038-9DB3-DE2B5A9BEFFB}"/>
+              </a:ext>
+              <a:ext uri="{C183D7F6-B498-43B3-948B-1728B52AA6E4}">
+                <adec:decorative xmlns:adec="http://schemas.microsoft.com/office/drawing/2017/decorative" val="1"/>
+              </a:ext>
+            </a:extLst>
+          </p:cNvPr>
+          <p:cNvSpPr>
+            <a:spLocks noGrp="1" noRot="1" noChangeAspect="1" noMove="1" noResize="1" noEditPoints="1" noAdjustHandles="1" noChangeArrowheads="1" noChangeShapeType="1" noTextEdit="1"/>
+          </p:cNvSpPr>
+          <p:nvPr>
+            <p:extLst>
+              <p:ext uri="{386F3935-93C4-4BCD-93E2-E3B085C9AB24}">
+                <p16:designElem xmlns:p16="http://schemas.microsoft.com/office/powerpoint/2015/main" val="1"/>
+              </p:ext>
+            </p:extLst>
+          </p:nvPr>
+        </p:nvSpPr>
+        <p:spPr>
+          <a:xfrm rot="5400000" flipH="1">
+            <a:off x="-1409318" y="1410082"/>
+            <a:ext cx="6858000" cy="4037835"/>
+          </a:xfrm>
+          <a:prstGeom prst="rect">
+            <a:avLst/>
+          </a:prstGeom>
+          <a:gradFill>
+            <a:gsLst>
+              <a:gs pos="8000">
+                <a:schemeClr val="accent6"/>
+              </a:gs>
+              <a:gs pos="100000">
+                <a:schemeClr val="accent5">
+                  <a:alpha val="89000"/>
+                </a:schemeClr>
+              </a:gs>
+            </a:gsLst>
+            <a:lin ang="3000000" scaled="0"/>
+          </a:gradFill>
+          <a:ln>
+            <a:noFill/>
+          </a:ln>
+        </p:spPr>
+        <p:style>
+          <a:lnRef idx="2">
+            <a:schemeClr val="accent1">
+              <a:shade val="50000"/>
+            </a:schemeClr>
+          </a:lnRef>
+          <a:fillRef idx="1">
+            <a:schemeClr val="accent1"/>
+          </a:fillRef>
+          <a:effectRef idx="0">
+            <a:schemeClr val="accent1"/>
+          </a:effectRef>
+          <a:fontRef idx="minor">
+            <a:schemeClr val="lt1"/>
+          </a:fontRef>
+        </p:style>
+        <p:txBody>
+          <a:bodyPr rtlCol="0" anchor="ctr"/>
+          <a:lstStyle/>
+          <a:p>
+            <a:pPr algn="ctr"/>
+            <a:endParaRPr lang="en-US"/>
+          </a:p>
+        </p:txBody>
+      </p:sp>
+      <p:sp>
+        <p:nvSpPr>
+          <p:cNvPr id="31" name="Rectangle 30">
+            <a:extLst>
+              <a:ext uri="{FF2B5EF4-FFF2-40B4-BE49-F238E27FC236}">
+                <a16:creationId xmlns:a16="http://schemas.microsoft.com/office/drawing/2014/main" id="{A2F10B26-073B-4B10-8AAA-161242DD82B0}"/>
+              </a:ext>
+              <a:ext uri="{C183D7F6-B498-43B3-948B-1728B52AA6E4}">
+                <adec:decorative xmlns:adec="http://schemas.microsoft.com/office/drawing/2017/decorative" val="1"/>
+              </a:ext>
+            </a:extLst>
+          </p:cNvPr>
+          <p:cNvSpPr>
+            <a:spLocks noGrp="1" noRot="1" noChangeAspect="1" noMove="1" noResize="1" noEditPoints="1" noAdjustHandles="1" noChangeArrowheads="1" noChangeShapeType="1" noTextEdit="1"/>
+          </p:cNvSpPr>
+          <p:nvPr>
+            <p:extLst>
+              <p:ext uri="{386F3935-93C4-4BCD-93E2-E3B085C9AB24}">
+                <p16:designElem xmlns:p16="http://schemas.microsoft.com/office/powerpoint/2015/main" val="1"/>
+              </p:ext>
+            </p:extLst>
+          </p:nvPr>
+        </p:nvSpPr>
+        <p:spPr>
+          <a:xfrm rot="5400000" flipH="1">
+            <a:off x="-1153806" y="1153804"/>
+            <a:ext cx="6346209" cy="4038601"/>
+          </a:xfrm>
+          <a:prstGeom prst="rect">
+            <a:avLst/>
+          </a:prstGeom>
+          <a:gradFill>
+            <a:gsLst>
+              <a:gs pos="0">
+                <a:schemeClr val="accent5">
+                  <a:lumMod val="60000"/>
+                  <a:lumOff val="40000"/>
+                  <a:alpha val="0"/>
+                </a:schemeClr>
+              </a:gs>
+              <a:gs pos="99000">
+                <a:schemeClr val="accent2">
+                  <a:alpha val="92000"/>
+                </a:schemeClr>
+              </a:gs>
+            </a:gsLst>
+            <a:lin ang="1800000" scaled="0"/>
+          </a:gradFill>
+          <a:ln>
+            <a:noFill/>
+          </a:ln>
+        </p:spPr>
+        <p:style>
+          <a:lnRef idx="2">
+            <a:schemeClr val="accent1">
+              <a:shade val="50000"/>
+            </a:schemeClr>
+          </a:lnRef>
+          <a:fillRef idx="1">
+            <a:schemeClr val="accent1"/>
+          </a:fillRef>
+          <a:effectRef idx="0">
+            <a:schemeClr val="accent1"/>
+          </a:effectRef>
+          <a:fontRef idx="minor">
+            <a:schemeClr val="lt1"/>
+          </a:fontRef>
+        </p:style>
+        <p:txBody>
+          <a:bodyPr rtlCol="0" anchor="ctr"/>
+          <a:lstStyle/>
+          <a:p>
+            <a:pPr algn="ctr"/>
+            <a:endParaRPr lang="en-US"/>
+          </a:p>
+        </p:txBody>
+      </p:sp>
+      <p:sp>
+        <p:nvSpPr>
+          <p:cNvPr id="33" name="Rectangle 32">
+            <a:extLst>
+              <a:ext uri="{FF2B5EF4-FFF2-40B4-BE49-F238E27FC236}">
+                <a16:creationId xmlns:a16="http://schemas.microsoft.com/office/drawing/2014/main" id="{610DBBC7-698F-4A54-B1CB-A99F9CC356DF}"/>
+              </a:ext>
+              <a:ext uri="{C183D7F6-B498-43B3-948B-1728B52AA6E4}">
+                <adec:decorative xmlns:adec="http://schemas.microsoft.com/office/drawing/2017/decorative" val="1"/>
+              </a:ext>
+            </a:extLst>
+          </p:cNvPr>
+          <p:cNvSpPr>
+            <a:spLocks noGrp="1" noRot="1" noChangeAspect="1" noMove="1" noResize="1" noEditPoints="1" noAdjustHandles="1" noChangeArrowheads="1" noChangeShapeType="1" noTextEdit="1"/>
+          </p:cNvSpPr>
+          <p:nvPr>
+            <p:extLst>
+              <p:ext uri="{386F3935-93C4-4BCD-93E2-E3B085C9AB24}">
+                <p16:designElem xmlns:p16="http://schemas.microsoft.com/office/powerpoint/2015/main" val="1"/>
+              </p:ext>
+            </p:extLst>
+          </p:nvPr>
+        </p:nvSpPr>
+        <p:spPr>
+          <a:xfrm rot="5400000" flipH="1">
+            <a:off x="759574" y="3578975"/>
+            <a:ext cx="2502407" cy="4055644"/>
+          </a:xfrm>
+          <a:prstGeom prst="rect">
+            <a:avLst/>
+          </a:prstGeom>
+          <a:gradFill>
+            <a:gsLst>
+              <a:gs pos="2000">
+                <a:schemeClr val="accent5">
+                  <a:alpha val="28000"/>
+                </a:schemeClr>
+              </a:gs>
+              <a:gs pos="100000">
+                <a:schemeClr val="accent4">
+                  <a:alpha val="0"/>
+                </a:schemeClr>
+              </a:gs>
+            </a:gsLst>
+            <a:lin ang="7800000" scaled="0"/>
+          </a:gradFill>
+          <a:ln>
+            <a:noFill/>
+          </a:ln>
+        </p:spPr>
+        <p:style>
+          <a:lnRef idx="2">
+            <a:schemeClr val="accent1">
+              <a:shade val="50000"/>
+            </a:schemeClr>
+          </a:lnRef>
+          <a:fillRef idx="1">
+            <a:schemeClr val="accent1"/>
+          </a:fillRef>
+          <a:effectRef idx="0">
+            <a:schemeClr val="accent1"/>
+          </a:effectRef>
+          <a:fontRef idx="minor">
+            <a:schemeClr val="lt1"/>
+          </a:fontRef>
+        </p:style>
+        <p:txBody>
+          <a:bodyPr rtlCol="0" anchor="ctr"/>
+          <a:lstStyle/>
+          <a:p>
+            <a:pPr algn="ctr"/>
+            <a:endParaRPr lang="en-US"/>
+          </a:p>
+        </p:txBody>
+      </p:sp>
+      <p:sp>
+        <p:nvSpPr>
+          <p:cNvPr id="35" name="Freeform: Shape 34">
+            <a:extLst>
+              <a:ext uri="{FF2B5EF4-FFF2-40B4-BE49-F238E27FC236}">
+                <a16:creationId xmlns:a16="http://schemas.microsoft.com/office/drawing/2014/main" id="{DE6E822A-8BCF-432C-83E6-BBE821476CD4}"/>
+              </a:ext>
+              <a:ext uri="{C183D7F6-B498-43B3-948B-1728B52AA6E4}">
+                <adec:decorative xmlns:adec="http://schemas.microsoft.com/office/drawing/2017/decorative" val="1"/>
+              </a:ext>
+            </a:extLst>
+          </p:cNvPr>
+          <p:cNvSpPr>
+            <a:spLocks noGrp="1" noRot="1" noChangeAspect="1" noMove="1" noResize="1" noEditPoints="1" noAdjustHandles="1" noChangeArrowheads="1" noChangeShapeType="1" noTextEdit="1"/>
+          </p:cNvSpPr>
+          <p:nvPr>
+            <p:extLst>
+              <p:ext uri="{386F3935-93C4-4BCD-93E2-E3B085C9AB24}">
+                <p16:designElem xmlns:p16="http://schemas.microsoft.com/office/powerpoint/2015/main" val="1"/>
+              </p:ext>
+            </p:extLst>
+          </p:nvPr>
+        </p:nvSpPr>
+        <p:spPr>
+          <a:xfrm rot="6097846">
+            <a:off x="-747355" y="1201312"/>
+            <a:ext cx="4808302" cy="4088666"/>
+          </a:xfrm>
+          <a:custGeom>
+            <a:avLst/>
+            <a:gdLst>
+              <a:gd name="connsiteX0" fmla="*/ 48844 w 4808302"/>
+              <a:gd name="connsiteY0" fmla="*/ 2888671 h 4088666"/>
+              <a:gd name="connsiteX1" fmla="*/ 0 w 4808302"/>
+              <a:gd name="connsiteY1" fmla="*/ 2404151 h 4088666"/>
+              <a:gd name="connsiteX2" fmla="*/ 2404151 w 4808302"/>
+              <a:gd name="connsiteY2" fmla="*/ 0 h 4088666"/>
+              <a:gd name="connsiteX3" fmla="*/ 4808302 w 4808302"/>
+              <a:gd name="connsiteY3" fmla="*/ 2404151 h 4088666"/>
+              <a:gd name="connsiteX4" fmla="*/ 4700216 w 4808302"/>
+              <a:gd name="connsiteY4" fmla="*/ 3119072 h 4088666"/>
+              <a:gd name="connsiteX5" fmla="*/ 4643143 w 4808302"/>
+              <a:gd name="connsiteY5" fmla="*/ 3275009 h 4088666"/>
+              <a:gd name="connsiteX6" fmla="*/ 690093 w 4808302"/>
+              <a:gd name="connsiteY6" fmla="*/ 4088666 h 4088666"/>
+              <a:gd name="connsiteX7" fmla="*/ 548991 w 4808302"/>
+              <a:gd name="connsiteY7" fmla="*/ 3933414 h 4088666"/>
+              <a:gd name="connsiteX8" fmla="*/ 48844 w 4808302"/>
+              <a:gd name="connsiteY8" fmla="*/ 2888671 h 4088666"/>
+            </a:gdLst>
+            <a:ahLst/>
+            <a:cxnLst>
+              <a:cxn ang="0">
+                <a:pos x="connsiteX0" y="connsiteY0"/>
+              </a:cxn>
+              <a:cxn ang="0">
+                <a:pos x="connsiteX1" y="connsiteY1"/>
+              </a:cxn>
+              <a:cxn ang="0">
+                <a:pos x="connsiteX2" y="connsiteY2"/>
+              </a:cxn>
+              <a:cxn ang="0">
+                <a:pos x="connsiteX3" y="connsiteY3"/>
+              </a:cxn>
+              <a:cxn ang="0">
+                <a:pos x="connsiteX4" y="connsiteY4"/>
+              </a:cxn>
+              <a:cxn ang="0">
+                <a:pos x="connsiteX5" y="connsiteY5"/>
+              </a:cxn>
+              <a:cxn ang="0">
+                <a:pos x="connsiteX6" y="connsiteY6"/>
+              </a:cxn>
+              <a:cxn ang="0">
+                <a:pos x="connsiteX7" y="connsiteY7"/>
+              </a:cxn>
+              <a:cxn ang="0">
+                <a:pos x="connsiteX8" y="connsiteY8"/>
+              </a:cxn>
+            </a:cxnLst>
+            <a:rect l="l" t="t" r="r" b="b"/>
+            <a:pathLst>
+              <a:path w="4808302" h="4088666">
+                <a:moveTo>
+                  <a:pt x="48844" y="2888671"/>
+                </a:moveTo>
+                <a:cubicBezTo>
+                  <a:pt x="16818" y="2732167"/>
+                  <a:pt x="0" y="2570123"/>
+                  <a:pt x="0" y="2404151"/>
+                </a:cubicBezTo>
+                <a:cubicBezTo>
+                  <a:pt x="0" y="1076375"/>
+                  <a:pt x="1076375" y="0"/>
+                  <a:pt x="2404151" y="0"/>
+                </a:cubicBezTo>
+                <a:cubicBezTo>
+                  <a:pt x="3731927" y="0"/>
+                  <a:pt x="4808302" y="1076375"/>
+                  <a:pt x="4808302" y="2404151"/>
+                </a:cubicBezTo>
+                <a:cubicBezTo>
+                  <a:pt x="4808302" y="2653109"/>
+                  <a:pt x="4770461" y="2893229"/>
+                  <a:pt x="4700216" y="3119072"/>
+                </a:cubicBezTo>
+                <a:lnTo>
+                  <a:pt x="4643143" y="3275009"/>
+                </a:lnTo>
+                <a:lnTo>
+                  <a:pt x="690093" y="4088666"/>
+                </a:lnTo>
+                <a:lnTo>
+                  <a:pt x="548991" y="3933414"/>
+                </a:lnTo>
+                <a:cubicBezTo>
+                  <a:pt x="304015" y="3636572"/>
+                  <a:pt x="128908" y="3279932"/>
+                  <a:pt x="48844" y="2888671"/>
+                </a:cubicBezTo>
+                <a:close/>
+              </a:path>
+            </a:pathLst>
+          </a:custGeom>
+          <a:gradFill>
+            <a:gsLst>
+              <a:gs pos="13000">
+                <a:schemeClr val="accent4">
+                  <a:lumMod val="20000"/>
+                  <a:lumOff val="80000"/>
+                  <a:alpha val="2000"/>
+                </a:schemeClr>
+              </a:gs>
+              <a:gs pos="100000">
+                <a:schemeClr val="accent6">
+                  <a:alpha val="29000"/>
+                </a:schemeClr>
+              </a:gs>
+            </a:gsLst>
+            <a:lin ang="16800000" scaled="0"/>
+          </a:gradFill>
+          <a:ln>
+            <a:noFill/>
+          </a:ln>
+        </p:spPr>
+        <p:style>
+          <a:lnRef idx="2">
+            <a:schemeClr val="accent1">
+              <a:shade val="50000"/>
+            </a:schemeClr>
+          </a:lnRef>
+          <a:fillRef idx="1">
+            <a:schemeClr val="accent1"/>
+          </a:fillRef>
+          <a:effectRef idx="0">
+            <a:schemeClr val="accent1"/>
+          </a:effectRef>
+          <a:fontRef idx="minor">
+            <a:schemeClr val="lt1"/>
+          </a:fontRef>
+        </p:style>
+        <p:txBody>
+          <a:bodyPr wrap="square" rtlCol="0" anchor="ctr">
+            <a:noAutofit/>
+          </a:bodyPr>
+          <a:lstStyle/>
+          <a:p>
+            <a:pPr algn="ctr"/>
+            <a:endParaRPr lang="en-US" dirty="0"/>
+          </a:p>
+        </p:txBody>
+      </p:sp>
+      <p:sp>
+        <p:nvSpPr>
           <p:cNvPr id="4" name="AutoShape 2">
             <a:extLst>
               <a:ext uri="{FF2B5EF4-FFF2-40B4-BE49-F238E27FC236}">
@@ -5779,7 +6591,7 @@
 </p:sld>
 </file>
 
-<file path=ppt/slides/slide13.xml><?xml version="1.0" encoding="utf-8"?>
+<file path=ppt/slides/slide14.xml><?xml version="1.0" encoding="utf-8"?>
 <p:sld xmlns:a="http://schemas.openxmlformats.org/drawingml/2006/main" xmlns:r="http://schemas.openxmlformats.org/officeDocument/2006/relationships" xmlns:p="http://schemas.openxmlformats.org/presentationml/2006/main">
   <p:cSld>
     <p:bg>

</xml_diff>